<commit_message>
Building the GUI now....
</commit_message>
<xml_diff>
--- a/pwig/templates/PIWG_A.pptx
+++ b/pwig/templates/PIWG_A.pptx
@@ -2261,10 +2261,13 @@
           <a:lstStyle/>
           <a:p>
             <a:r>
-              <a:rPr lang="en-US"/>
-              <a:t>PIWG Action Item 18-002</a:t>
-            </a:r>
-            <a:endParaRPr lang="en-US" dirty="0"/>
+              <a:rPr lang="en-US" dirty="0" err="1"/>
+              <a:t>PIWG</a:t>
+            </a:r>
+            <a:r>
+              <a:rPr lang="en-US" dirty="0"/>
+              <a:t> Action Item XX-XXX</a:t>
+            </a:r>
           </a:p>
         </p:txBody>
       </p:sp>
@@ -2563,708 +2566,6 @@
             <a:r>
               <a:rPr lang="en-US" sz="1600" dirty="0"/>
               <a:t>Problem Background</a:t>
-            </a:r>
-          </a:p>
-        </p:txBody>
-      </p:sp>
-      <p:sp>
-        <p:nvSpPr>
-          <p:cNvPr id="3" name="TextBox 2">
-            <a:extLst>
-              <a:ext uri="{FF2B5EF4-FFF2-40B4-BE49-F238E27FC236}">
-                <a16:creationId xmlns:a16="http://schemas.microsoft.com/office/drawing/2014/main" id="{1F61301C-A609-4ADE-B598-92819C7940D8}"/>
-              </a:ext>
-            </a:extLst>
-          </p:cNvPr>
-          <p:cNvSpPr txBox="1"/>
-          <p:nvPr/>
-        </p:nvSpPr>
-        <p:spPr>
-          <a:xfrm>
-            <a:off x="749808" y="1097280"/>
-            <a:ext cx="5277485" cy="365760"/>
-          </a:xfrm>
-          <a:prstGeom prst="rect">
-            <a:avLst/>
-          </a:prstGeom>
-          <a:noFill/>
-        </p:spPr>
-        <p:txBody>
-          <a:bodyPr vert="horz" rtlCol="0">
-            <a:spAutoFit/>
-          </a:bodyPr>
-          <a:lstStyle/>
-          <a:p>
-            <a:r>
-              <a:rPr lang="en-US"/>
-              <a:t>This is Title #2</a:t>
-            </a:r>
-          </a:p>
-        </p:txBody>
-      </p:sp>
-      <p:sp>
-        <p:nvSpPr>
-          <p:cNvPr id="6" name="TextBox 5">
-            <a:extLst>
-              <a:ext uri="{FF2B5EF4-FFF2-40B4-BE49-F238E27FC236}">
-                <a16:creationId xmlns:a16="http://schemas.microsoft.com/office/drawing/2014/main" id="{BEBEE305-4AB0-4910-A1D0-92E03111BA1B}"/>
-              </a:ext>
-            </a:extLst>
-          </p:cNvPr>
-          <p:cNvSpPr txBox="1"/>
-          <p:nvPr/>
-        </p:nvSpPr>
-        <p:spPr>
-          <a:xfrm>
-            <a:off x="1143000" y="1371600"/>
-            <a:ext cx="2578100" cy="365760"/>
-          </a:xfrm>
-          <a:prstGeom prst="rect">
-            <a:avLst/>
-          </a:prstGeom>
-          <a:noFill/>
-        </p:spPr>
-        <p:txBody>
-          <a:bodyPr vert="horz" rtlCol="0">
-            <a:spAutoFit/>
-          </a:bodyPr>
-          <a:lstStyle/>
-          <a:p>
-            <a:r>
-              <a:rPr lang="en-US"/>
-              <a:t>9/16/2020</a:t>
-            </a:r>
-          </a:p>
-        </p:txBody>
-      </p:sp>
-      <p:sp>
-        <p:nvSpPr>
-          <p:cNvPr id="10" name="TextBox 9">
-            <a:extLst>
-              <a:ext uri="{FF2B5EF4-FFF2-40B4-BE49-F238E27FC236}">
-                <a16:creationId xmlns:a16="http://schemas.microsoft.com/office/drawing/2014/main" id="{DE10C9B8-3A17-4970-9DE6-FE802DCD39A7}"/>
-              </a:ext>
-            </a:extLst>
-          </p:cNvPr>
-          <p:cNvSpPr txBox="1"/>
-          <p:nvPr/>
-        </p:nvSpPr>
-        <p:spPr>
-          <a:xfrm>
-            <a:off x="667512" y="1636776"/>
-            <a:ext cx="3200400" cy="365760"/>
-          </a:xfrm>
-          <a:prstGeom prst="rect">
-            <a:avLst/>
-          </a:prstGeom>
-          <a:noFill/>
-        </p:spPr>
-        <p:txBody>
-          <a:bodyPr vert="horz" rtlCol="0">
-            <a:spAutoFit/>
-          </a:bodyPr>
-          <a:lstStyle/>
-          <a:p>
-            <a:r>
-              <a:rPr lang="en-US"/>
-              <a:t>Pn2</a:t>
-            </a:r>
-          </a:p>
-        </p:txBody>
-      </p:sp>
-      <p:sp>
-        <p:nvSpPr>
-          <p:cNvPr id="11" name="TextBox 10">
-            <a:extLst>
-              <a:ext uri="{FF2B5EF4-FFF2-40B4-BE49-F238E27FC236}">
-                <a16:creationId xmlns:a16="http://schemas.microsoft.com/office/drawing/2014/main" id="{40BDA156-C1AE-468B-AB65-8227FCFE6CF5}"/>
-              </a:ext>
-            </a:extLst>
-          </p:cNvPr>
-          <p:cNvSpPr txBox="1"/>
-          <p:nvPr/>
-        </p:nvSpPr>
-        <p:spPr>
-          <a:xfrm>
-            <a:off x="1362456" y="1920240"/>
-            <a:ext cx="5029200" cy="646331"/>
-          </a:xfrm>
-          <a:prstGeom prst="rect">
-            <a:avLst/>
-          </a:prstGeom>
-          <a:noFill/>
-        </p:spPr>
-        <p:txBody>
-          <a:bodyPr vert="horz" rtlCol="0">
-            <a:spAutoFit/>
-          </a:bodyPr>
-          <a:lstStyle/>
-          <a:p>
-            <a:r>
-              <a:rPr lang="en-US"/>
-              <a:t>Tech 2</a:t>
-            </a:r>
-          </a:p>
-          <a:p>
-            <a:r>
-              <a:rPr lang="en-US"/>
-              <a:t> </a:t>
-            </a:r>
-          </a:p>
-        </p:txBody>
-      </p:sp>
-      <p:sp>
-        <p:nvSpPr>
-          <p:cNvPr id="12" name="TextBox 11">
-            <a:extLst>
-              <a:ext uri="{FF2B5EF4-FFF2-40B4-BE49-F238E27FC236}">
-                <a16:creationId xmlns:a16="http://schemas.microsoft.com/office/drawing/2014/main" id="{59317FB9-CFD8-4408-9C18-94A03A3258D9}"/>
-              </a:ext>
-            </a:extLst>
-          </p:cNvPr>
-          <p:cNvSpPr txBox="1"/>
-          <p:nvPr/>
-        </p:nvSpPr>
-        <p:spPr>
-          <a:xfrm>
-            <a:off x="4489704" y="1371600"/>
-            <a:ext cx="1473200" cy="365760"/>
-          </a:xfrm>
-          <a:prstGeom prst="rect">
-            <a:avLst/>
-          </a:prstGeom>
-          <a:noFill/>
-        </p:spPr>
-        <p:txBody>
-          <a:bodyPr vert="horz" rtlCol="0">
-            <a:spAutoFit/>
-          </a:bodyPr>
-          <a:lstStyle/>
-          <a:p>
-            <a:r>
-              <a:rPr lang="en-US"/>
-              <a:t>WUC2</a:t>
-            </a:r>
-          </a:p>
-        </p:txBody>
-      </p:sp>
-      <p:sp>
-        <p:nvSpPr>
-          <p:cNvPr id="13" name="TextBox 12">
-            <a:extLst>
-              <a:ext uri="{FF2B5EF4-FFF2-40B4-BE49-F238E27FC236}">
-                <a16:creationId xmlns:a16="http://schemas.microsoft.com/office/drawing/2014/main" id="{78785FB8-69B5-4DA9-A946-E7E566AB608B}"/>
-              </a:ext>
-            </a:extLst>
-          </p:cNvPr>
-          <p:cNvSpPr txBox="1"/>
-          <p:nvPr/>
-        </p:nvSpPr>
-        <p:spPr>
-          <a:xfrm>
-            <a:off x="4425696" y="1651000"/>
-            <a:ext cx="1636776" cy="365760"/>
-          </a:xfrm>
-          <a:prstGeom prst="rect">
-            <a:avLst/>
-          </a:prstGeom>
-          <a:noFill/>
-        </p:spPr>
-        <p:txBody>
-          <a:bodyPr vert="horz" rtlCol="0">
-            <a:spAutoFit/>
-          </a:bodyPr>
-          <a:lstStyle/>
-          <a:p>
-            <a:r>
-              <a:rPr lang="en-US"/>
-              <a:t>NSN2</a:t>
-            </a:r>
-          </a:p>
-        </p:txBody>
-      </p:sp>
-      <p:sp>
-        <p:nvSpPr>
-          <p:cNvPr id="14" name="TextBox 13">
-            <a:extLst>
-              <a:ext uri="{FF2B5EF4-FFF2-40B4-BE49-F238E27FC236}">
-                <a16:creationId xmlns:a16="http://schemas.microsoft.com/office/drawing/2014/main" id="{0C355CAE-256A-49B9-83C9-F444A9E4E4CB}"/>
-              </a:ext>
-            </a:extLst>
-          </p:cNvPr>
-          <p:cNvSpPr txBox="1"/>
-          <p:nvPr/>
-        </p:nvSpPr>
-        <p:spPr>
-          <a:xfrm>
-            <a:off x="1115568" y="2194560"/>
-            <a:ext cx="5029200" cy="365760"/>
-          </a:xfrm>
-          <a:prstGeom prst="rect">
-            <a:avLst/>
-          </a:prstGeom>
-          <a:noFill/>
-        </p:spPr>
-        <p:txBody>
-          <a:bodyPr vert="horz" rtlCol="0">
-            <a:spAutoFit/>
-          </a:bodyPr>
-          <a:lstStyle/>
-          <a:p>
-            <a:r>
-              <a:rPr lang="en-US"/>
-              <a:t>IN2</a:t>
-            </a:r>
-          </a:p>
-        </p:txBody>
-      </p:sp>
-      <p:sp>
-        <p:nvSpPr>
-          <p:cNvPr id="15" name="TextBox 14">
-            <a:extLst>
-              <a:ext uri="{FF2B5EF4-FFF2-40B4-BE49-F238E27FC236}">
-                <a16:creationId xmlns:a16="http://schemas.microsoft.com/office/drawing/2014/main" id="{FC95D70B-92FF-4E38-AAE5-A394FD014309}"/>
-              </a:ext>
-            </a:extLst>
-          </p:cNvPr>
-          <p:cNvSpPr txBox="1"/>
-          <p:nvPr/>
-        </p:nvSpPr>
-        <p:spPr>
-          <a:xfrm>
-            <a:off x="5065776" y="2249424"/>
-            <a:ext cx="960120" cy="365760"/>
-          </a:xfrm>
-          <a:prstGeom prst="rect">
-            <a:avLst/>
-          </a:prstGeom>
-          <a:noFill/>
-        </p:spPr>
-        <p:txBody>
-          <a:bodyPr vert="horz" rtlCol="0">
-            <a:spAutoFit/>
-          </a:bodyPr>
-          <a:lstStyle/>
-          <a:p>
-            <a:r>
-              <a:rPr lang="en-US"/>
-              <a:t>ᰕ/</a:t>
-            </a:r>
-          </a:p>
-        </p:txBody>
-      </p:sp>
-      <p:sp>
-        <p:nvSpPr>
-          <p:cNvPr id="16" name="TextBox 15">
-            <a:extLst>
-              <a:ext uri="{FF2B5EF4-FFF2-40B4-BE49-F238E27FC236}">
-                <a16:creationId xmlns:a16="http://schemas.microsoft.com/office/drawing/2014/main" id="{875A48E5-7375-4EFB-AD3E-B3FBA30FAAFE}"/>
-              </a:ext>
-            </a:extLst>
-          </p:cNvPr>
-          <p:cNvSpPr txBox="1"/>
-          <p:nvPr/>
-        </p:nvSpPr>
-        <p:spPr>
-          <a:xfrm>
-            <a:off x="1792224" y="2468880"/>
-            <a:ext cx="4318000" cy="365760"/>
-          </a:xfrm>
-          <a:prstGeom prst="rect">
-            <a:avLst/>
-          </a:prstGeom>
-          <a:noFill/>
-        </p:spPr>
-        <p:txBody>
-          <a:bodyPr vert="horz" rtlCol="0">
-            <a:spAutoFit/>
-          </a:bodyPr>
-          <a:lstStyle/>
-          <a:p>
-            <a:r>
-              <a:rPr lang="en-US"/>
-              <a:t>AON2</a:t>
-            </a:r>
-          </a:p>
-        </p:txBody>
-      </p:sp>
-      <p:sp>
-        <p:nvSpPr>
-          <p:cNvPr id="17" name="TextBox 16">
-            <a:extLst>
-              <a:ext uri="{FF2B5EF4-FFF2-40B4-BE49-F238E27FC236}">
-                <a16:creationId xmlns:a16="http://schemas.microsoft.com/office/drawing/2014/main" id="{75243CAF-E223-4629-B21D-5EF2F12EE543}"/>
-              </a:ext>
-            </a:extLst>
-          </p:cNvPr>
-          <p:cNvSpPr txBox="1"/>
-          <p:nvPr/>
-        </p:nvSpPr>
-        <p:spPr>
-          <a:xfrm>
-            <a:off x="5065776" y="2478024"/>
-            <a:ext cx="960120" cy="365760"/>
-          </a:xfrm>
-          <a:prstGeom prst="rect">
-            <a:avLst/>
-          </a:prstGeom>
-          <a:noFill/>
-        </p:spPr>
-        <p:txBody>
-          <a:bodyPr vert="horz" rtlCol="0">
-            <a:spAutoFit/>
-          </a:bodyPr>
-          <a:lstStyle/>
-          <a:p>
-            <a:r>
-              <a:rPr lang="en-US"/>
-              <a:t>ᰕ2</a:t>
-            </a:r>
-          </a:p>
-        </p:txBody>
-      </p:sp>
-      <p:sp>
-        <p:nvSpPr>
-          <p:cNvPr id="18" name="TextBox 17">
-            <a:extLst>
-              <a:ext uri="{FF2B5EF4-FFF2-40B4-BE49-F238E27FC236}">
-                <a16:creationId xmlns:a16="http://schemas.microsoft.com/office/drawing/2014/main" id="{47FDBDD6-FB95-4133-B6DC-9C7447C06851}"/>
-              </a:ext>
-            </a:extLst>
-          </p:cNvPr>
-          <p:cNvSpPr txBox="1"/>
-          <p:nvPr/>
-        </p:nvSpPr>
-        <p:spPr>
-          <a:xfrm>
-            <a:off x="1865376" y="2734056"/>
-            <a:ext cx="4224528" cy="365760"/>
-          </a:xfrm>
-          <a:prstGeom prst="rect">
-            <a:avLst/>
-          </a:prstGeom>
-          <a:noFill/>
-        </p:spPr>
-        <p:txBody>
-          <a:bodyPr vert="horz" rtlCol="0">
-            <a:spAutoFit/>
-          </a:bodyPr>
-          <a:lstStyle/>
-          <a:p>
-            <a:r>
-              <a:rPr lang="en-US"/>
-              <a:t>Open</a:t>
-            </a:r>
-          </a:p>
-        </p:txBody>
-      </p:sp>
-      <p:sp>
-        <p:nvSpPr>
-          <p:cNvPr id="19" name="TextBox 18">
-            <a:extLst>
-              <a:ext uri="{FF2B5EF4-FFF2-40B4-BE49-F238E27FC236}">
-                <a16:creationId xmlns:a16="http://schemas.microsoft.com/office/drawing/2014/main" id="{87FB77A0-AC44-4C72-9FDF-3B834822E196}"/>
-              </a:ext>
-            </a:extLst>
-          </p:cNvPr>
-          <p:cNvSpPr txBox="1"/>
-          <p:nvPr/>
-        </p:nvSpPr>
-        <p:spPr>
-          <a:xfrm>
-            <a:off x="2953512" y="3017520"/>
-            <a:ext cx="3149600" cy="365760"/>
-          </a:xfrm>
-          <a:prstGeom prst="rect">
-            <a:avLst/>
-          </a:prstGeom>
-          <a:noFill/>
-        </p:spPr>
-        <p:txBody>
-          <a:bodyPr vert="horz" rtlCol="0">
-            <a:spAutoFit/>
-          </a:bodyPr>
-          <a:lstStyle/>
-          <a:p>
-            <a:r>
-              <a:rPr lang="en-US"/>
-              <a:t>Close Project</a:t>
-            </a:r>
-          </a:p>
-        </p:txBody>
-      </p:sp>
-      <p:sp>
-        <p:nvSpPr>
-          <p:cNvPr id="20" name="TextBox 19">
-            <a:extLst>
-              <a:ext uri="{FF2B5EF4-FFF2-40B4-BE49-F238E27FC236}">
-                <a16:creationId xmlns:a16="http://schemas.microsoft.com/office/drawing/2014/main" id="{63CEDCD8-6748-4566-BAAF-2968F00A6997}"/>
-              </a:ext>
-            </a:extLst>
-          </p:cNvPr>
-          <p:cNvSpPr txBox="1"/>
-          <p:nvPr/>
-        </p:nvSpPr>
-        <p:spPr>
-          <a:xfrm>
-            <a:off x="6309360" y="1362456"/>
-            <a:ext cx="5678424" cy="276999"/>
-          </a:xfrm>
-          <a:prstGeom prst="rect">
-            <a:avLst/>
-          </a:prstGeom>
-          <a:noFill/>
-        </p:spPr>
-        <p:txBody>
-          <a:bodyPr vert="horz" rtlCol="0">
-            <a:spAutoFit/>
-          </a:bodyPr>
-          <a:lstStyle/>
-          <a:p>
-            <a:r>
-              <a:rPr lang="en-US" sz="1200"/>
-              <a:t>- History Milestones1</a:t>
-            </a:r>
-          </a:p>
-        </p:txBody>
-      </p:sp>
-      <p:sp>
-        <p:nvSpPr>
-          <p:cNvPr id="21" name="TextBox 20">
-            <a:extLst>
-              <a:ext uri="{FF2B5EF4-FFF2-40B4-BE49-F238E27FC236}">
-                <a16:creationId xmlns:a16="http://schemas.microsoft.com/office/drawing/2014/main" id="{9530319C-C4C2-49D8-A851-F35029E50BAF}"/>
-              </a:ext>
-            </a:extLst>
-          </p:cNvPr>
-          <p:cNvSpPr txBox="1"/>
-          <p:nvPr/>
-        </p:nvSpPr>
-        <p:spPr>
-          <a:xfrm>
-            <a:off x="6309360" y="2532888"/>
-            <a:ext cx="5678424" cy="276999"/>
-          </a:xfrm>
-          <a:prstGeom prst="rect">
-            <a:avLst/>
-          </a:prstGeom>
-          <a:noFill/>
-        </p:spPr>
-        <p:txBody>
-          <a:bodyPr vert="horz" rtlCol="0">
-            <a:spAutoFit/>
-          </a:bodyPr>
-          <a:lstStyle/>
-          <a:p>
-            <a:r>
-              <a:rPr lang="en-US" sz="1200"/>
-              <a:t>- Mile Sch A</a:t>
-            </a:r>
-          </a:p>
-        </p:txBody>
-      </p:sp>
-      <p:sp>
-        <p:nvSpPr>
-          <p:cNvPr id="22" name="TextBox 21">
-            <a:extLst>
-              <a:ext uri="{FF2B5EF4-FFF2-40B4-BE49-F238E27FC236}">
-                <a16:creationId xmlns:a16="http://schemas.microsoft.com/office/drawing/2014/main" id="{1CEE8045-5269-4B3B-9E7B-6E3310FEC6E9}"/>
-              </a:ext>
-            </a:extLst>
-          </p:cNvPr>
-          <p:cNvSpPr txBox="1"/>
-          <p:nvPr/>
-        </p:nvSpPr>
-        <p:spPr>
-          <a:xfrm>
-            <a:off x="182880" y="3968496"/>
-            <a:ext cx="5788152" cy="2246769"/>
-          </a:xfrm>
-          <a:prstGeom prst="rect">
-            <a:avLst/>
-          </a:prstGeom>
-          <a:noFill/>
-        </p:spPr>
-        <p:txBody>
-          <a:bodyPr vert="horz" rtlCol="0">
-            <a:spAutoFit/>
-          </a:bodyPr>
-          <a:lstStyle/>
-          <a:p>
-            <a:r>
-              <a:rPr lang="en-US" sz="1400"/>
-              <a:t>Background of the Problem . Remember all of that reading you did to choose your topic? This section of your proposal is where you share that knowledge with your reader. In this section you should: Demonstrate that you have thoroughly researched your topic; show this by discussing the breadth and depth of prior work in this area …</a:t>
-            </a:r>
-          </a:p>
-          <a:p>
-            <a:r>
-              <a:rPr lang="en-US" sz="1400"/>
-              <a:t> </a:t>
-            </a:r>
-          </a:p>
-          <a:p>
-            <a:r>
-              <a:rPr lang="en-US" sz="1400"/>
-              <a:t>- Some Stuff Here</a:t>
-            </a:r>
-          </a:p>
-          <a:p>
-            <a:r>
-              <a:rPr lang="en-US" sz="1400"/>
-              <a:t>    A. This is one</a:t>
-            </a:r>
-          </a:p>
-          <a:p>
-            <a:r>
-              <a:rPr lang="en-US" sz="1400"/>
-              <a:t>    B. This is another</a:t>
-            </a:r>
-          </a:p>
-          <a:p>
-            <a:r>
-              <a:rPr lang="en-US" sz="1400"/>
-              <a:t>    C. Somting Else</a:t>
-            </a:r>
-          </a:p>
-        </p:txBody>
-      </p:sp>
-      <p:sp>
-        <p:nvSpPr>
-          <p:cNvPr id="23" name="TextBox 22">
-            <a:extLst>
-              <a:ext uri="{FF2B5EF4-FFF2-40B4-BE49-F238E27FC236}">
-                <a16:creationId xmlns:a16="http://schemas.microsoft.com/office/drawing/2014/main" id="{7CA41934-406D-4AEC-978B-E46B08283AFC}"/>
-              </a:ext>
-            </a:extLst>
-          </p:cNvPr>
-          <p:cNvSpPr txBox="1"/>
-          <p:nvPr/>
-        </p:nvSpPr>
-        <p:spPr>
-          <a:xfrm>
-            <a:off x="6291072" y="3968496"/>
-            <a:ext cx="5788152" cy="1169551"/>
-          </a:xfrm>
-          <a:prstGeom prst="rect">
-            <a:avLst/>
-          </a:prstGeom>
-          <a:noFill/>
-        </p:spPr>
-        <p:txBody>
-          <a:bodyPr vert="horz" rtlCol="0">
-            <a:spAutoFit/>
-          </a:bodyPr>
-          <a:lstStyle/>
-          <a:p>
-            <a:r>
-              <a:rPr lang="en-US" sz="1400"/>
-              <a:t>The purpose of Technical Solution (TS) is to help in the selection of the design and implementing solution to requirements. Technical Solution involves working with product, product components, lifecycle model selection etc. TS focuses on evaluating, selecting solutions, developing details designs and then implementing these designs.</a:t>
-            </a:r>
-          </a:p>
-        </p:txBody>
-      </p:sp>
-      <p:sp>
-        <p:nvSpPr>
-          <p:cNvPr id="24" name="Rectangle 23">
-            <a:extLst>
-              <a:ext uri="{FF2B5EF4-FFF2-40B4-BE49-F238E27FC236}">
-                <a16:creationId xmlns:a16="http://schemas.microsoft.com/office/drawing/2014/main" id="{17EE9FB9-FD63-44E6-A99A-30CCA8CF35B8}"/>
-              </a:ext>
-            </a:extLst>
-          </p:cNvPr>
-          <p:cNvSpPr/>
-          <p:nvPr/>
-        </p:nvSpPr>
-        <p:spPr bwMode="auto">
-          <a:xfrm>
-            <a:off x="9207500" y="190500"/>
-            <a:ext cx="723900" cy="723900"/>
-          </a:xfrm>
-          <a:prstGeom prst="rect">
-            <a:avLst/>
-          </a:prstGeom>
-          <a:solidFill>
-            <a:srgbClr val="FFFF00"/>
-          </a:solidFill>
-          <a:ln w="25400" cap="flat" cmpd="sng" algn="ctr">
-            <a:solidFill>
-              <a:schemeClr val="tx1"/>
-            </a:solidFill>
-            <a:prstDash val="solid"/>
-            <a:round/>
-            <a:headEnd type="none" w="med" len="med"/>
-            <a:tailEnd type="none" w="med" len="med"/>
-          </a:ln>
-          <a:effectLst/>
-        </p:spPr>
-        <p:txBody>
-          <a:bodyPr vert="horz" wrap="square" lIns="91440" tIns="45720" rIns="91440" bIns="45720" numCol="1" rtlCol="0" anchor="t" anchorCtr="0" compatLnSpc="1">
-            <a:prstTxWarp prst="textNoShape">
-              <a:avLst/>
-            </a:prstTxWarp>
-          </a:bodyPr>
-          <a:lstStyle/>
-          <a:p>
-            <a:pPr marL="0" marR="0" indent="0" algn="l" defTabSz="914400" rtl="0" eaLnBrk="0" fontAlgn="base" latinLnBrk="0" hangingPunct="0">
-              <a:lnSpc>
-                <a:spcPct val="100000"/>
-              </a:lnSpc>
-              <a:spcBef>
-                <a:spcPct val="0"/>
-              </a:spcBef>
-              <a:spcAft>
-                <a:spcPct val="0"/>
-              </a:spcAft>
-              <a:buClrTx/>
-              <a:buSzTx/>
-              <a:buFontTx/>
-              <a:buNone/>
-              <a:tabLst/>
-            </a:pPr>
-            <a:endParaRPr kumimoji="0" lang="en-US" sz="2400" b="0" i="0" u="none" strike="noStrike" cap="none" normalizeH="0" baseline="0">
-              <a:ln>
-                <a:noFill/>
-              </a:ln>
-              <a:solidFill>
-                <a:schemeClr val="tx1"/>
-              </a:solidFill>
-              <a:effectLst/>
-              <a:latin typeface="Times New Roman" pitchFamily="18" charset="0"/>
-            </a:endParaRPr>
-          </a:p>
-        </p:txBody>
-      </p:sp>
-      <p:sp>
-        <p:nvSpPr>
-          <p:cNvPr id="25" name="TextBox 24">
-            <a:extLst>
-              <a:ext uri="{FF2B5EF4-FFF2-40B4-BE49-F238E27FC236}">
-                <a16:creationId xmlns:a16="http://schemas.microsoft.com/office/drawing/2014/main" id="{6CF99DDF-2FE3-46C5-B054-54BB3FD077AB}"/>
-              </a:ext>
-            </a:extLst>
-          </p:cNvPr>
-          <p:cNvSpPr txBox="1"/>
-          <p:nvPr/>
-        </p:nvSpPr>
-        <p:spPr>
-          <a:xfrm>
-            <a:off x="9258300" y="114300"/>
-            <a:ext cx="723900" cy="892552"/>
-          </a:xfrm>
-          <a:prstGeom prst="rect">
-            <a:avLst/>
-          </a:prstGeom>
-          <a:noFill/>
-        </p:spPr>
-        <p:txBody>
-          <a:bodyPr vert="horz" rtlCol="0">
-            <a:spAutoFit/>
-          </a:bodyPr>
-          <a:lstStyle/>
-          <a:p>
-            <a:r>
-              <a:rPr lang="en-US" sz="5200"/>
-              <a:t>Y</a:t>
             </a:r>
           </a:p>
         </p:txBody>
@@ -4243,18 +3544,18 @@
 </file>
 
 <file path=customXml/item1.xml><?xml version="1.0" encoding="utf-8"?>
+<p:properties xmlns:p="http://schemas.microsoft.com/office/2006/metadata/properties" xmlns:xsi="http://www.w3.org/2001/XMLSchema-instance" xmlns:pc="http://schemas.microsoft.com/office/infopath/2007/PartnerControls">
+  <documentManagement/>
+</p:properties>
+</file>
+
+<file path=customXml/item2.xml><?xml version="1.0" encoding="utf-8"?>
 <?mso-contentType ?>
 <FormTemplates xmlns="http://schemas.microsoft.com/sharepoint/v3/contenttype/forms">
   <Display>DocumentLibraryForm</Display>
   <Edit>DocumentLibraryForm</Edit>
   <New>DocumentLibraryForm</New>
 </FormTemplates>
-</file>
-
-<file path=customXml/item2.xml><?xml version="1.0" encoding="utf-8"?>
-<p:properties xmlns:p="http://schemas.microsoft.com/office/2006/metadata/properties" xmlns:xsi="http://www.w3.org/2001/XMLSchema-instance" xmlns:pc="http://schemas.microsoft.com/office/infopath/2007/PartnerControls">
-  <documentManagement/>
-</p:properties>
 </file>
 
 <file path=customXml/item3.xml><?xml version="1.0" encoding="utf-8"?>
@@ -4390,14 +3691,6 @@
 </file>
 
 <file path=customXml/itemProps1.xml><?xml version="1.0" encoding="utf-8"?>
-<ds:datastoreItem xmlns:ds="http://schemas.openxmlformats.org/officeDocument/2006/customXml" ds:itemID="{76507C1F-597C-46E0-B38A-93206C8D4D64}">
-  <ds:schemaRefs>
-    <ds:schemaRef ds:uri="http://schemas.microsoft.com/sharepoint/v3/contenttype/forms"/>
-  </ds:schemaRefs>
-</ds:datastoreItem>
-</file>
-
-<file path=customXml/itemProps2.xml><?xml version="1.0" encoding="utf-8"?>
 <ds:datastoreItem xmlns:ds="http://schemas.openxmlformats.org/officeDocument/2006/customXml" ds:itemID="{BA63CB79-D955-4144-8235-BEA7782D08C3}">
   <ds:schemaRefs>
     <ds:schemaRef ds:uri="http://schemas.microsoft.com/office/2006/metadata/properties"/>
@@ -4409,6 +3702,14 @@
     <ds:schemaRef ds:uri="http://www.w3.org/XML/1998/namespace"/>
     <ds:schemaRef ds:uri="http://purl.org/dc/elements/1.1/"/>
     <ds:schemaRef ds:uri="http://schemas.microsoft.com/office/infopath/2007/PartnerControls"/>
+  </ds:schemaRefs>
+</ds:datastoreItem>
+</file>
+
+<file path=customXml/itemProps2.xml><?xml version="1.0" encoding="utf-8"?>
+<ds:datastoreItem xmlns:ds="http://schemas.openxmlformats.org/officeDocument/2006/customXml" ds:itemID="{76507C1F-597C-46E0-B38A-93206C8D4D64}">
+  <ds:schemaRefs>
+    <ds:schemaRef ds:uri="http://schemas.microsoft.com/sharepoint/v3/contenttype/forms"/>
   </ds:schemaRefs>
 </ds:datastoreItem>
 </file>

</xml_diff>

<commit_message>
Some small update for Friday
</commit_message>
<xml_diff>
--- a/pwig/templates/PIWG_A.pptx
+++ b/pwig/templates/PIWG_A.pptx
@@ -2261,12 +2261,8 @@
           <a:lstStyle/>
           <a:p>
             <a:r>
-              <a:rPr lang="en-US" dirty="0" err="1"/>
-              <a:t>PIWG</a:t>
-            </a:r>
-            <a:r>
               <a:rPr lang="en-US" dirty="0"/>
-              <a:t> Action Item XX-XXX</a:t>
+              <a:t>PIWG Action Item XX-XXX</a:t>
             </a:r>
           </a:p>
         </p:txBody>
@@ -3544,21 +3540,6 @@
 </file>
 
 <file path=customXml/item1.xml><?xml version="1.0" encoding="utf-8"?>
-<p:properties xmlns:p="http://schemas.microsoft.com/office/2006/metadata/properties" xmlns:xsi="http://www.w3.org/2001/XMLSchema-instance" xmlns:pc="http://schemas.microsoft.com/office/infopath/2007/PartnerControls">
-  <documentManagement/>
-</p:properties>
-</file>
-
-<file path=customXml/item2.xml><?xml version="1.0" encoding="utf-8"?>
-<?mso-contentType ?>
-<FormTemplates xmlns="http://schemas.microsoft.com/sharepoint/v3/contenttype/forms">
-  <Display>DocumentLibraryForm</Display>
-  <Edit>DocumentLibraryForm</Edit>
-  <New>DocumentLibraryForm</New>
-</FormTemplates>
-</file>
-
-<file path=customXml/item3.xml><?xml version="1.0" encoding="utf-8"?>
 <ct:contentTypeSchema xmlns:ct="http://schemas.microsoft.com/office/2006/metadata/contentType" xmlns:ma="http://schemas.microsoft.com/office/2006/metadata/properties/metaAttributes" ct:_="" ma:_="" ma:contentTypeName="Document" ma:contentTypeID="0x01010001BAF69B99080249A3914E3579D92C16" ma:contentTypeVersion="4" ma:contentTypeDescription="Create a new document." ma:contentTypeScope="" ma:versionID="0f9914b082425826d23f6110b5f3d7cb">
   <xsd:schema xmlns:xsd="http://www.w3.org/2001/XMLSchema" xmlns:xs="http://www.w3.org/2001/XMLSchema" xmlns:p="http://schemas.microsoft.com/office/2006/metadata/properties" xmlns:ns2="52c9c5b4-cdfc-4c48-bb59-69e421c2e0d8" targetNamespace="http://schemas.microsoft.com/office/2006/metadata/properties" ma:root="true" ma:fieldsID="e4455ee2d899b4bd46b7b5c9fefc55e3" ns2:_="">
     <xsd:import namespace="52c9c5b4-cdfc-4c48-bb59-69e421c2e0d8"/>
@@ -3690,31 +3671,22 @@
 </ct:contentTypeSchema>
 </file>
 
-<file path=customXml/itemProps1.xml><?xml version="1.0" encoding="utf-8"?>
-<ds:datastoreItem xmlns:ds="http://schemas.openxmlformats.org/officeDocument/2006/customXml" ds:itemID="{BA63CB79-D955-4144-8235-BEA7782D08C3}">
-  <ds:schemaRefs>
-    <ds:schemaRef ds:uri="http://schemas.microsoft.com/office/2006/metadata/properties"/>
-    <ds:schemaRef ds:uri="http://purl.org/dc/terms/"/>
-    <ds:schemaRef ds:uri="52c9c5b4-cdfc-4c48-bb59-69e421c2e0d8"/>
-    <ds:schemaRef ds:uri="http://purl.org/dc/dcmitype/"/>
-    <ds:schemaRef ds:uri="http://schemas.microsoft.com/office/2006/documentManagement/types"/>
-    <ds:schemaRef ds:uri="http://schemas.openxmlformats.org/package/2006/metadata/core-properties"/>
-    <ds:schemaRef ds:uri="http://www.w3.org/XML/1998/namespace"/>
-    <ds:schemaRef ds:uri="http://purl.org/dc/elements/1.1/"/>
-    <ds:schemaRef ds:uri="http://schemas.microsoft.com/office/infopath/2007/PartnerControls"/>
-  </ds:schemaRefs>
-</ds:datastoreItem>
+<file path=customXml/item2.xml><?xml version="1.0" encoding="utf-8"?>
+<?mso-contentType ?>
+<FormTemplates xmlns="http://schemas.microsoft.com/sharepoint/v3/contenttype/forms">
+  <Display>DocumentLibraryForm</Display>
+  <Edit>DocumentLibraryForm</Edit>
+  <New>DocumentLibraryForm</New>
+</FormTemplates>
 </file>
 
-<file path=customXml/itemProps2.xml><?xml version="1.0" encoding="utf-8"?>
-<ds:datastoreItem xmlns:ds="http://schemas.openxmlformats.org/officeDocument/2006/customXml" ds:itemID="{76507C1F-597C-46E0-B38A-93206C8D4D64}">
-  <ds:schemaRefs>
-    <ds:schemaRef ds:uri="http://schemas.microsoft.com/sharepoint/v3/contenttype/forms"/>
-  </ds:schemaRefs>
-</ds:datastoreItem>
+<file path=customXml/item3.xml><?xml version="1.0" encoding="utf-8"?>
+<p:properties xmlns:p="http://schemas.microsoft.com/office/2006/metadata/properties" xmlns:xsi="http://www.w3.org/2001/XMLSchema-instance" xmlns:pc="http://schemas.microsoft.com/office/infopath/2007/PartnerControls">
+  <documentManagement/>
+</p:properties>
 </file>
 
-<file path=customXml/itemProps3.xml><?xml version="1.0" encoding="utf-8"?>
+<file path=customXml/itemProps1.xml><?xml version="1.0" encoding="utf-8"?>
 <ds:datastoreItem xmlns:ds="http://schemas.openxmlformats.org/officeDocument/2006/customXml" ds:itemID="{D713D47C-5C44-4A6F-8CA2-9E8724493351}">
   <ds:schemaRefs>
     <ds:schemaRef ds:uri="http://schemas.microsoft.com/office/2006/metadata/contentType"/>
@@ -3730,4 +3702,28 @@
     <ds:schemaRef ds:uri="http://schemas.microsoft.com/internal/obd"/>
   </ds:schemaRefs>
 </ds:datastoreItem>
+</file>
+
+<file path=customXml/itemProps2.xml><?xml version="1.0" encoding="utf-8"?>
+<ds:datastoreItem xmlns:ds="http://schemas.openxmlformats.org/officeDocument/2006/customXml" ds:itemID="{76507C1F-597C-46E0-B38A-93206C8D4D64}">
+  <ds:schemaRefs>
+    <ds:schemaRef ds:uri="http://schemas.microsoft.com/sharepoint/v3/contenttype/forms"/>
+  </ds:schemaRefs>
+</ds:datastoreItem>
+</file>
+
+<file path=customXml/itemProps3.xml><?xml version="1.0" encoding="utf-8"?>
+<ds:datastoreItem xmlns:ds="http://schemas.openxmlformats.org/officeDocument/2006/customXml" ds:itemID="{BA63CB79-D955-4144-8235-BEA7782D08C3}">
+  <ds:schemaRefs>
+    <ds:schemaRef ds:uri="http://schemas.microsoft.com/office/2006/metadata/properties"/>
+    <ds:schemaRef ds:uri="http://purl.org/dc/terms/"/>
+    <ds:schemaRef ds:uri="52c9c5b4-cdfc-4c48-bb59-69e421c2e0d8"/>
+    <ds:schemaRef ds:uri="http://purl.org/dc/dcmitype/"/>
+    <ds:schemaRef ds:uri="http://schemas.microsoft.com/office/2006/documentManagement/types"/>
+    <ds:schemaRef ds:uri="http://schemas.openxmlformats.org/package/2006/metadata/core-properties"/>
+    <ds:schemaRef ds:uri="http://www.w3.org/XML/1998/namespace"/>
+    <ds:schemaRef ds:uri="http://purl.org/dc/elements/1.1/"/>
+    <ds:schemaRef ds:uri="http://schemas.microsoft.com/office/infopath/2007/PartnerControls"/>
+  </ds:schemaRefs>
+</ds:datastoreItem>
 </file>
</xml_diff>